<commit_message>
Reorganize project: move scripts to scripts/, submission docs to docs/submission/, add submission ZIP, fix PowerPoint newlines and add GitHub links
</commit_message>
<xml_diff>
--- a/presentation/10Alytics_Governance_Growth_Gap.pptx
+++ b/presentation/10Alytics_Governance_Growth_Gap.pptx
@@ -4048,6 +4048,49 @@
           </a:p>
         </p:txBody>
       </p:sp>
+      <p:sp>
+        <p:nvSpPr>
+          <p:cNvPr id="5" name="TextBox 4"/>
+          <p:cNvSpPr txBox="1"/>
+          <p:nvPr/>
+        </p:nvSpPr>
+        <p:spPr>
+          <a:xfrm>
+            <a:off x="457200" y="5943600"/>
+            <a:ext cx="8229600" cy="731520"/>
+          </a:xfrm>
+          <a:prstGeom prst="rect">
+            <a:avLst/>
+          </a:prstGeom>
+          <a:noFill/>
+        </p:spPr>
+        <p:txBody>
+          <a:bodyPr wrap="square">
+            <a:spAutoFit/>
+          </a:bodyPr>
+          <a:lstStyle/>
+          <a:p>
+            <a:pPr algn="ctr">
+              <a:defRPr sz="1000">
+                <a:latin typeface="Calibri"/>
+              </a:defRPr>
+            </a:pPr>
+            <a:r>
+              <a:t>📦 Complete Submission: GitHub (Live Code) + ZIP (All Files - Extract to View)</a:t>
+            </a:r>
+          </a:p>
+          <a:p>
+            <a:pPr algn="ctr">
+              <a:defRPr sz="900" b="1">
+                <a:latin typeface="Calibri"/>
+              </a:defRPr>
+            </a:pPr>
+            <a:r>
+              <a:t>https://github.com/Basit-Balogun10/africa-governance-growth-gap-analysis</a:t>
+            </a:r>
+          </a:p>
+        </p:txBody>
+      </p:sp>
     </p:spTree>
   </p:cSld>
   <p:clrMapOvr>
@@ -5110,7 +5153,51 @@
               </a:defRPr>
             </a:pPr>
             <a:r>
-              <a:t>Questions? Challenges?\n\nLet's Discuss.</a:t>
+              <a:t>Questions? Challenges?
+Let's Discuss.</a:t>
+            </a:r>
+          </a:p>
+        </p:txBody>
+      </p:sp>
+      <p:sp>
+        <p:nvSpPr>
+          <p:cNvPr id="3" name="TextBox 2"/>
+          <p:cNvSpPr txBox="1"/>
+          <p:nvPr/>
+        </p:nvSpPr>
+        <p:spPr>
+          <a:xfrm>
+            <a:off x="457200" y="5486400"/>
+            <a:ext cx="8229600" cy="731520"/>
+          </a:xfrm>
+          <a:prstGeom prst="rect">
+            <a:avLst/>
+          </a:prstGeom>
+          <a:noFill/>
+        </p:spPr>
+        <p:txBody>
+          <a:bodyPr wrap="square">
+            <a:spAutoFit/>
+          </a:bodyPr>
+          <a:lstStyle/>
+          <a:p>
+            <a:pPr algn="ctr">
+              <a:defRPr sz="1000">
+                <a:latin typeface="Calibri"/>
+              </a:defRPr>
+            </a:pPr>
+            <a:r>
+              <a:t>📦 Full Submission ZIP (13MB - Please Extract): See repo or contact basitbalogun10@gmail.com</a:t>
+            </a:r>
+          </a:p>
+          <a:p>
+            <a:pPr algn="ctr">
+              <a:defRPr sz="900" b="1">
+                <a:latin typeface="Calibri"/>
+              </a:defRPr>
+            </a:pPr>
+            <a:r>
+              <a:t>GitHub: https://github.com/Basit-Balogun10/africa-governance-growth-gap-analysis</a:t>
             </a:r>
           </a:p>
         </p:txBody>
@@ -5198,7 +5285,8 @@
               </a:defRPr>
             </a:pPr>
             <a:r>
-              <a:t>We analyzed 14 African countries across 65 years\n\nand found the OPPOSITE.</a:t>
+              <a:t>We analyzed 14 African countries across 65 years
+and found the OPPOSITE.</a:t>
             </a:r>
           </a:p>
         </p:txBody>

</xml_diff>